<commit_message>
added figures of comparison
</commit_message>
<xml_diff>
--- a/C1_documentation/summary_july.pptx
+++ b/C1_documentation/summary_july.pptx
@@ -217,7 +217,7 @@
           <a:p>
             <a:fld id="{50CF4913-0E48-4457-B4C6-F9395B99064E}" type="datetimeFigureOut">
               <a:rPr lang="en-US" smtClean="0"/>
-              <a:t>8/5/2024</a:t>
+              <a:t>8/21/2024</a:t>
             </a:fld>
             <a:endParaRPr lang="en-US"/>
           </a:p>
@@ -3734,7 +3734,7 @@
           <a:p>
             <a:fld id="{D810D133-1E25-4587-947C-F546FFDA3FBF}" type="datetimeFigureOut">
               <a:rPr lang="en-US" smtClean="0"/>
-              <a:t>8/5/2024</a:t>
+              <a:t>8/21/2024</a:t>
             </a:fld>
             <a:endParaRPr lang="en-US"/>
           </a:p>
@@ -3904,7 +3904,7 @@
           <a:p>
             <a:fld id="{D810D133-1E25-4587-947C-F546FFDA3FBF}" type="datetimeFigureOut">
               <a:rPr lang="en-US" smtClean="0"/>
-              <a:t>8/5/2024</a:t>
+              <a:t>8/21/2024</a:t>
             </a:fld>
             <a:endParaRPr lang="en-US"/>
           </a:p>
@@ -4084,7 +4084,7 @@
           <a:p>
             <a:fld id="{D810D133-1E25-4587-947C-F546FFDA3FBF}" type="datetimeFigureOut">
               <a:rPr lang="en-US" smtClean="0"/>
-              <a:t>8/5/2024</a:t>
+              <a:t>8/21/2024</a:t>
             </a:fld>
             <a:endParaRPr lang="en-US"/>
           </a:p>
@@ -4254,7 +4254,7 @@
           <a:p>
             <a:fld id="{D810D133-1E25-4587-947C-F546FFDA3FBF}" type="datetimeFigureOut">
               <a:rPr lang="en-US" smtClean="0"/>
-              <a:t>8/5/2024</a:t>
+              <a:t>8/21/2024</a:t>
             </a:fld>
             <a:endParaRPr lang="en-US"/>
           </a:p>
@@ -4500,7 +4500,7 @@
           <a:p>
             <a:fld id="{D810D133-1E25-4587-947C-F546FFDA3FBF}" type="datetimeFigureOut">
               <a:rPr lang="en-US" smtClean="0"/>
-              <a:t>8/5/2024</a:t>
+              <a:t>8/21/2024</a:t>
             </a:fld>
             <a:endParaRPr lang="en-US"/>
           </a:p>
@@ -4732,7 +4732,7 @@
           <a:p>
             <a:fld id="{D810D133-1E25-4587-947C-F546FFDA3FBF}" type="datetimeFigureOut">
               <a:rPr lang="en-US" smtClean="0"/>
-              <a:t>8/5/2024</a:t>
+              <a:t>8/21/2024</a:t>
             </a:fld>
             <a:endParaRPr lang="en-US"/>
           </a:p>
@@ -5099,7 +5099,7 @@
           <a:p>
             <a:fld id="{D810D133-1E25-4587-947C-F546FFDA3FBF}" type="datetimeFigureOut">
               <a:rPr lang="en-US" smtClean="0"/>
-              <a:t>8/5/2024</a:t>
+              <a:t>8/21/2024</a:t>
             </a:fld>
             <a:endParaRPr lang="en-US"/>
           </a:p>
@@ -5217,7 +5217,7 @@
           <a:p>
             <a:fld id="{D810D133-1E25-4587-947C-F546FFDA3FBF}" type="datetimeFigureOut">
               <a:rPr lang="en-US" smtClean="0"/>
-              <a:t>8/5/2024</a:t>
+              <a:t>8/21/2024</a:t>
             </a:fld>
             <a:endParaRPr lang="en-US"/>
           </a:p>
@@ -5312,7 +5312,7 @@
           <a:p>
             <a:fld id="{D810D133-1E25-4587-947C-F546FFDA3FBF}" type="datetimeFigureOut">
               <a:rPr lang="en-US" smtClean="0"/>
-              <a:t>8/5/2024</a:t>
+              <a:t>8/21/2024</a:t>
             </a:fld>
             <a:endParaRPr lang="en-US"/>
           </a:p>
@@ -5589,7 +5589,7 @@
           <a:p>
             <a:fld id="{D810D133-1E25-4587-947C-F546FFDA3FBF}" type="datetimeFigureOut">
               <a:rPr lang="en-US" smtClean="0"/>
-              <a:t>8/5/2024</a:t>
+              <a:t>8/21/2024</a:t>
             </a:fld>
             <a:endParaRPr lang="en-US"/>
           </a:p>
@@ -5842,7 +5842,7 @@
           <a:p>
             <a:fld id="{D810D133-1E25-4587-947C-F546FFDA3FBF}" type="datetimeFigureOut">
               <a:rPr lang="en-US" smtClean="0"/>
-              <a:t>8/5/2024</a:t>
+              <a:t>8/21/2024</a:t>
             </a:fld>
             <a:endParaRPr lang="en-US"/>
           </a:p>
@@ -6055,7 +6055,7 @@
           <a:p>
             <a:fld id="{D810D133-1E25-4587-947C-F546FFDA3FBF}" type="datetimeFigureOut">
               <a:rPr lang="en-US" smtClean="0"/>
-              <a:t>8/5/2024</a:t>
+              <a:t>8/21/2024</a:t>
             </a:fld>
             <a:endParaRPr lang="en-US"/>
           </a:p>
@@ -15930,7 +15930,7 @@
         <p:spPr/>
         <p:txBody>
           <a:bodyPr>
-            <a:normAutofit fontScale="92500" lnSpcReduction="20000"/>
+            <a:normAutofit fontScale="85000" lnSpcReduction="10000"/>
           </a:bodyPr>
           <a:lstStyle/>
           <a:p>
@@ -16211,7 +16211,7 @@
             <a:r>
               <a:rPr lang="fr-CH" dirty="0" err="1" smtClean="0">
                 <a:solidFill>
-                  <a:srgbClr val="C00000"/>
+                  <a:schemeClr val="accent6"/>
                 </a:solidFill>
               </a:rPr>
               <a:t>Investigate</a:t>
@@ -16219,7 +16219,7 @@
             <a:r>
               <a:rPr lang="fr-CH" dirty="0" smtClean="0">
                 <a:solidFill>
-                  <a:srgbClr val="C00000"/>
+                  <a:schemeClr val="accent6"/>
                 </a:solidFill>
               </a:rPr>
               <a:t> sites </a:t>
@@ -16227,7 +16227,7 @@
             <a:r>
               <a:rPr lang="fr-CH" dirty="0" err="1" smtClean="0">
                 <a:solidFill>
-                  <a:srgbClr val="C00000"/>
+                  <a:schemeClr val="accent6"/>
                 </a:solidFill>
               </a:rPr>
               <a:t>with</a:t>
@@ -16235,7 +16235,7 @@
             <a:r>
               <a:rPr lang="fr-CH" dirty="0" smtClean="0">
                 <a:solidFill>
-                  <a:srgbClr val="C00000"/>
+                  <a:schemeClr val="accent6"/>
                 </a:solidFill>
               </a:rPr>
               <a:t> </a:t>
@@ -16243,7 +16243,7 @@
             <a:r>
               <a:rPr lang="fr-CH" dirty="0" err="1" smtClean="0">
                 <a:solidFill>
-                  <a:srgbClr val="C00000"/>
+                  <a:schemeClr val="accent6"/>
                 </a:solidFill>
               </a:rPr>
               <a:t>strong</a:t>
@@ -16251,7 +16251,7 @@
             <a:r>
               <a:rPr lang="fr-CH" dirty="0" smtClean="0">
                 <a:solidFill>
-                  <a:srgbClr val="C00000"/>
+                  <a:schemeClr val="accent6"/>
                 </a:solidFill>
               </a:rPr>
               <a:t> </a:t>
@@ -16259,7 +16259,7 @@
             <a:r>
               <a:rPr lang="fr-CH" dirty="0" err="1" smtClean="0">
                 <a:solidFill>
-                  <a:srgbClr val="C00000"/>
+                  <a:schemeClr val="accent6"/>
                 </a:solidFill>
               </a:rPr>
               <a:t>irregular</a:t>
@@ -16267,7 +16267,7 @@
             <a:r>
               <a:rPr lang="fr-CH" dirty="0" smtClean="0">
                 <a:solidFill>
-                  <a:srgbClr val="C00000"/>
+                  <a:schemeClr val="accent6"/>
                 </a:solidFill>
               </a:rPr>
               <a:t> </a:t>
@@ -16275,7 +16275,7 @@
             <a:r>
               <a:rPr lang="fr-CH" dirty="0" err="1" smtClean="0">
                 <a:solidFill>
-                  <a:srgbClr val="C00000"/>
+                  <a:schemeClr val="accent6"/>
                 </a:solidFill>
               </a:rPr>
               <a:t>shape</a:t>
@@ -16283,7 +16283,7 @@
             <a:r>
               <a:rPr lang="fr-CH" dirty="0" smtClean="0">
                 <a:solidFill>
-                  <a:srgbClr val="C00000"/>
+                  <a:schemeClr val="accent6"/>
                 </a:solidFill>
               </a:rPr>
               <a:t>, </a:t>
@@ -16291,7 +16291,7 @@
             <a:r>
               <a:rPr lang="fr-CH" dirty="0" err="1" smtClean="0">
                 <a:solidFill>
-                  <a:srgbClr val="C00000"/>
+                  <a:schemeClr val="accent6"/>
                 </a:solidFill>
               </a:rPr>
               <a:t>print</a:t>
@@ -16299,7 +16299,7 @@
             <a:r>
               <a:rPr lang="fr-CH" dirty="0" smtClean="0">
                 <a:solidFill>
-                  <a:srgbClr val="C00000"/>
+                  <a:schemeClr val="accent6"/>
                 </a:solidFill>
               </a:rPr>
               <a:t> </a:t>
@@ -16307,7 +16307,7 @@
             <a:r>
               <a:rPr lang="fr-CH" dirty="0" err="1" smtClean="0">
                 <a:solidFill>
-                  <a:srgbClr val="C00000"/>
+                  <a:schemeClr val="accent6"/>
                 </a:solidFill>
               </a:rPr>
               <a:t>additional</a:t>
@@ -16315,7 +16315,7 @@
             <a:r>
               <a:rPr lang="fr-CH" dirty="0" smtClean="0">
                 <a:solidFill>
-                  <a:srgbClr val="C00000"/>
+                  <a:schemeClr val="accent6"/>
                 </a:solidFill>
               </a:rPr>
               <a:t> output, check </a:t>
@@ -16323,7 +16323,7 @@
             <a:r>
               <a:rPr lang="fr-CH" dirty="0" err="1" smtClean="0">
                 <a:solidFill>
-                  <a:srgbClr val="C00000"/>
+                  <a:schemeClr val="accent6"/>
                 </a:solidFill>
               </a:rPr>
               <a:t>food</a:t>
@@ -16331,7 +16331,7 @@
             <a:r>
               <a:rPr lang="fr-CH" dirty="0" smtClean="0">
                 <a:solidFill>
-                  <a:srgbClr val="C00000"/>
+                  <a:schemeClr val="accent6"/>
                 </a:solidFill>
               </a:rPr>
               <a:t> limitation</a:t>
@@ -16396,10 +16396,249 @@
             <a:r>
               <a:rPr lang="fr-CH" dirty="0" smtClean="0">
                 <a:solidFill>
+                  <a:schemeClr val="accent6"/>
+                </a:solidFill>
+              </a:rPr>
+              <a:t>Check ICE 50 </a:t>
+            </a:r>
+            <a:r>
+              <a:rPr lang="fr-CH" dirty="0" err="1" smtClean="0">
+                <a:solidFill>
+                  <a:schemeClr val="accent6"/>
+                </a:solidFill>
+              </a:rPr>
+              <a:t>years</a:t>
+            </a:r>
+            <a:r>
+              <a:rPr lang="fr-CH" dirty="0" smtClean="0">
+                <a:solidFill>
+                  <a:schemeClr val="accent6"/>
+                </a:solidFill>
+              </a:rPr>
+              <a:t> 30 </a:t>
+            </a:r>
+            <a:r>
+              <a:rPr lang="fr-CH" dirty="0" err="1" smtClean="0">
+                <a:solidFill>
+                  <a:schemeClr val="accent6"/>
+                </a:solidFill>
+              </a:rPr>
+              <a:t>steps</a:t>
+            </a:r>
+            <a:r>
+              <a:rPr lang="fr-CH" dirty="0" smtClean="0">
+                <a:solidFill>
+                  <a:schemeClr val="accent6"/>
+                </a:solidFill>
+              </a:rPr>
+              <a:t> for </a:t>
+            </a:r>
+            <a:r>
+              <a:rPr lang="fr-CH" dirty="0" err="1" smtClean="0">
+                <a:solidFill>
+                  <a:schemeClr val="accent6"/>
+                </a:solidFill>
+              </a:rPr>
+              <a:t>Baetis</a:t>
+            </a:r>
+            <a:r>
+              <a:rPr lang="fr-CH" dirty="0" smtClean="0">
+                <a:solidFill>
+                  <a:schemeClr val="accent6"/>
+                </a:solidFill>
+              </a:rPr>
+              <a:t> </a:t>
+            </a:r>
+            <a:r>
+              <a:rPr lang="fr-CH" dirty="0" err="1" smtClean="0">
+                <a:solidFill>
+                  <a:schemeClr val="accent6"/>
+                </a:solidFill>
+              </a:rPr>
+              <a:t>alpinus</a:t>
+            </a:r>
+            <a:r>
+              <a:rPr lang="fr-CH" dirty="0" smtClean="0">
+                <a:solidFill>
+                  <a:schemeClr val="accent6"/>
+                </a:solidFill>
+              </a:rPr>
+              <a:t> for </a:t>
+            </a:r>
+          </a:p>
+          <a:p>
+            <a:pPr lvl="1"/>
+            <a:r>
+              <a:rPr lang="en-US" dirty="0" smtClean="0">
+                <a:solidFill>
+                  <a:schemeClr val="accent6"/>
+                </a:solidFill>
+              </a:rPr>
+              <a:t>SynthPoint1961Aa (Aare) (drop at 8.11 degrees)</a:t>
+            </a:r>
+            <a:endParaRPr lang="fr-CH" dirty="0">
+              <a:solidFill>
+                <a:schemeClr val="accent6"/>
+              </a:solidFill>
+            </a:endParaRPr>
+          </a:p>
+          <a:p>
+            <a:pPr lvl="1"/>
+            <a:r>
+              <a:rPr lang="en-US" dirty="0" smtClean="0">
+                <a:solidFill>
+                  <a:schemeClr val="accent6"/>
+                </a:solidFill>
+              </a:rPr>
+              <a:t>SynthPoint6969Rh (</a:t>
+            </a:r>
+            <a:r>
+              <a:rPr lang="en-US" dirty="0" err="1" smtClean="0">
+                <a:solidFill>
+                  <a:schemeClr val="accent6"/>
+                </a:solidFill>
+              </a:rPr>
+              <a:t>Rhein</a:t>
+            </a:r>
+            <a:r>
+              <a:rPr lang="en-US" dirty="0" smtClean="0">
+                <a:solidFill>
+                  <a:schemeClr val="accent6"/>
+                </a:solidFill>
+              </a:rPr>
+              <a:t>) (drop at 4.86 degrees)</a:t>
+            </a:r>
+          </a:p>
+          <a:p>
+            <a:r>
+              <a:rPr lang="fr-CH" dirty="0" err="1" smtClean="0">
+                <a:solidFill>
+                  <a:schemeClr val="accent6"/>
+                </a:solidFill>
+              </a:rPr>
+              <a:t>Depending</a:t>
+            </a:r>
+            <a:r>
+              <a:rPr lang="fr-CH" dirty="0" smtClean="0">
+                <a:solidFill>
+                  <a:schemeClr val="accent6"/>
+                </a:solidFill>
+              </a:rPr>
+              <a:t> on final </a:t>
+            </a:r>
+            <a:r>
+              <a:rPr lang="fr-CH" dirty="0" err="1" smtClean="0">
+                <a:solidFill>
+                  <a:schemeClr val="accent6"/>
+                </a:solidFill>
+              </a:rPr>
+              <a:t>choice</a:t>
+            </a:r>
+            <a:r>
+              <a:rPr lang="fr-CH" dirty="0" smtClean="0">
+                <a:solidFill>
+                  <a:schemeClr val="accent6"/>
+                </a:solidFill>
+              </a:rPr>
+              <a:t> of </a:t>
+            </a:r>
+            <a:r>
+              <a:rPr lang="fr-CH" dirty="0" err="1" smtClean="0">
+                <a:solidFill>
+                  <a:schemeClr val="accent6"/>
+                </a:solidFill>
+              </a:rPr>
+              <a:t>parameters</a:t>
+            </a:r>
+            <a:r>
+              <a:rPr lang="fr-CH" dirty="0" smtClean="0">
+                <a:solidFill>
+                  <a:schemeClr val="accent6"/>
+                </a:solidFill>
+              </a:rPr>
+              <a:t>, </a:t>
+            </a:r>
+            <a:r>
+              <a:rPr lang="fr-CH" dirty="0" err="1" smtClean="0">
+                <a:solidFill>
+                  <a:schemeClr val="accent6"/>
+                </a:solidFill>
+              </a:rPr>
+              <a:t>produce</a:t>
+            </a:r>
+            <a:r>
+              <a:rPr lang="fr-CH" dirty="0" smtClean="0">
+                <a:solidFill>
+                  <a:schemeClr val="accent6"/>
+                </a:solidFill>
+              </a:rPr>
+              <a:t> data </a:t>
+            </a:r>
+            <a:r>
+              <a:rPr lang="fr-CH" dirty="0" err="1" smtClean="0">
+                <a:solidFill>
+                  <a:schemeClr val="accent6"/>
+                </a:solidFill>
+              </a:rPr>
+              <a:t>again</a:t>
+            </a:r>
+            <a:r>
+              <a:rPr lang="fr-CH" dirty="0" smtClean="0">
+                <a:solidFill>
+                  <a:schemeClr val="accent6"/>
+                </a:solidFill>
+              </a:rPr>
+              <a:t> (ICE, 100 sites, </a:t>
+            </a:r>
+            <a:r>
+              <a:rPr lang="fr-CH" dirty="0" err="1" smtClean="0">
+                <a:solidFill>
+                  <a:schemeClr val="accent6"/>
+                </a:solidFill>
+              </a:rPr>
+              <a:t>entire</a:t>
+            </a:r>
+            <a:r>
+              <a:rPr lang="fr-CH" dirty="0" smtClean="0">
+                <a:solidFill>
+                  <a:schemeClr val="accent6"/>
+                </a:solidFill>
+              </a:rPr>
+              <a:t> </a:t>
+            </a:r>
+            <a:r>
+              <a:rPr lang="fr-CH" dirty="0" err="1" smtClean="0">
+                <a:solidFill>
+                  <a:schemeClr val="accent6"/>
+                </a:solidFill>
+              </a:rPr>
+              <a:t>dataset</a:t>
+            </a:r>
+            <a:r>
+              <a:rPr lang="fr-CH" dirty="0" smtClean="0">
+                <a:solidFill>
+                  <a:schemeClr val="accent6"/>
+                </a:solidFill>
+              </a:rPr>
+              <a:t> 3000 sites</a:t>
+            </a:r>
+            <a:r>
+              <a:rPr lang="fr-CH" dirty="0" smtClean="0">
+                <a:solidFill>
+                  <a:schemeClr val="accent6"/>
+                </a:solidFill>
+              </a:rPr>
+              <a:t>)</a:t>
+            </a:r>
+          </a:p>
+          <a:p>
+            <a:r>
+              <a:rPr lang="fr-CH" dirty="0" smtClean="0">
+                <a:solidFill>
                   <a:srgbClr val="C00000"/>
                 </a:solidFill>
               </a:rPr>
-              <a:t>Check ICE 50 </a:t>
+              <a:t>Clean scripts and </a:t>
             </a:r>
             <a:r>
               <a:rPr lang="fr-CH" dirty="0" err="1" smtClean="0">
@@ -16407,7 +16646,7 @@
                   <a:srgbClr val="C00000"/>
                 </a:solidFill>
               </a:rPr>
-              <a:t>years</a:t>
+              <a:t>folders</a:t>
             </a:r>
             <a:r>
               <a:rPr lang="fr-CH" dirty="0" smtClean="0">
@@ -16415,7 +16654,7 @@
                   <a:srgbClr val="C00000"/>
                 </a:solidFill>
               </a:rPr>
-              <a:t> 30 </a:t>
+              <a:t>, </a:t>
             </a:r>
             <a:r>
               <a:rPr lang="fr-CH" dirty="0" err="1" smtClean="0">
@@ -16423,7 +16662,7 @@
                   <a:srgbClr val="C00000"/>
                 </a:solidFill>
               </a:rPr>
-              <a:t>steps</a:t>
+              <a:t>write</a:t>
             </a:r>
             <a:r>
               <a:rPr lang="fr-CH" dirty="0" smtClean="0">
@@ -16431,7 +16670,7 @@
                   <a:srgbClr val="C00000"/>
                 </a:solidFill>
               </a:rPr>
-              <a:t> for </a:t>
+              <a:t> </a:t>
             </a:r>
             <a:r>
               <a:rPr lang="fr-CH" dirty="0" err="1" smtClean="0">
@@ -16439,7 +16678,7 @@
                   <a:srgbClr val="C00000"/>
                 </a:solidFill>
               </a:rPr>
-              <a:t>Baetis</a:t>
+              <a:t>comments</a:t>
             </a:r>
             <a:r>
               <a:rPr lang="fr-CH" dirty="0" smtClean="0">
@@ -16447,7 +16686,7 @@
                   <a:srgbClr val="C00000"/>
                 </a:solidFill>
               </a:rPr>
-              <a:t> </a:t>
+              <a:t>, </a:t>
             </a:r>
             <a:r>
               <a:rPr lang="fr-CH" dirty="0" err="1" smtClean="0">
@@ -16455,7 +16694,7 @@
                   <a:srgbClr val="C00000"/>
                 </a:solidFill>
               </a:rPr>
-              <a:t>alpinus</a:t>
+              <a:t>write</a:t>
             </a:r>
             <a:r>
               <a:rPr lang="fr-CH" dirty="0" smtClean="0">
@@ -16463,179 +16702,13 @@
                   <a:srgbClr val="C00000"/>
                 </a:solidFill>
               </a:rPr>
-              <a:t> for </a:t>
+              <a:t> documentation</a:t>
             </a:r>
             <a:endParaRPr lang="fr-CH" dirty="0" smtClean="0">
               <a:solidFill>
                 <a:srgbClr val="C00000"/>
               </a:solidFill>
             </a:endParaRPr>
-          </a:p>
-          <a:p>
-            <a:pPr lvl="1"/>
-            <a:r>
-              <a:rPr lang="en-US" dirty="0" smtClean="0"/>
-              <a:t>SynthPoint1961Aa (Aare) (drop at 8.11 degrees)</a:t>
-            </a:r>
-            <a:endParaRPr lang="fr-CH" dirty="0">
-              <a:solidFill>
-                <a:srgbClr val="C00000"/>
-              </a:solidFill>
-            </a:endParaRPr>
-          </a:p>
-          <a:p>
-            <a:pPr lvl="1"/>
-            <a:r>
-              <a:rPr lang="en-US" dirty="0" smtClean="0">
-                <a:solidFill>
-                  <a:srgbClr val="C00000"/>
-                </a:solidFill>
-              </a:rPr>
-              <a:t>SynthPoint6969Rh </a:t>
-            </a:r>
-            <a:r>
-              <a:rPr lang="en-US" dirty="0" smtClean="0">
-                <a:solidFill>
-                  <a:srgbClr val="C00000"/>
-                </a:solidFill>
-              </a:rPr>
-              <a:t>(</a:t>
-            </a:r>
-            <a:r>
-              <a:rPr lang="en-US" dirty="0" err="1" smtClean="0">
-                <a:solidFill>
-                  <a:srgbClr val="C00000"/>
-                </a:solidFill>
-              </a:rPr>
-              <a:t>Rhein</a:t>
-            </a:r>
-            <a:r>
-              <a:rPr lang="en-US" dirty="0" smtClean="0">
-                <a:solidFill>
-                  <a:srgbClr val="C00000"/>
-                </a:solidFill>
-              </a:rPr>
-              <a:t>) (drop at 4.86 degrees)</a:t>
-            </a:r>
-            <a:endParaRPr lang="en-US" dirty="0" smtClean="0">
-              <a:solidFill>
-                <a:srgbClr val="C00000"/>
-              </a:solidFill>
-            </a:endParaRPr>
-          </a:p>
-          <a:p>
-            <a:r>
-              <a:rPr lang="fr-CH" dirty="0" err="1" smtClean="0">
-                <a:solidFill>
-                  <a:srgbClr val="C00000"/>
-                </a:solidFill>
-              </a:rPr>
-              <a:t>Depending</a:t>
-            </a:r>
-            <a:r>
-              <a:rPr lang="fr-CH" dirty="0" smtClean="0">
-                <a:solidFill>
-                  <a:srgbClr val="C00000"/>
-                </a:solidFill>
-              </a:rPr>
-              <a:t> on final </a:t>
-            </a:r>
-            <a:r>
-              <a:rPr lang="fr-CH" dirty="0" err="1" smtClean="0">
-                <a:solidFill>
-                  <a:srgbClr val="C00000"/>
-                </a:solidFill>
-              </a:rPr>
-              <a:t>choice</a:t>
-            </a:r>
-            <a:r>
-              <a:rPr lang="fr-CH" dirty="0" smtClean="0">
-                <a:solidFill>
-                  <a:srgbClr val="C00000"/>
-                </a:solidFill>
-              </a:rPr>
-              <a:t> of </a:t>
-            </a:r>
-            <a:r>
-              <a:rPr lang="fr-CH" dirty="0" err="1" smtClean="0">
-                <a:solidFill>
-                  <a:srgbClr val="C00000"/>
-                </a:solidFill>
-              </a:rPr>
-              <a:t>parameters</a:t>
-            </a:r>
-            <a:r>
-              <a:rPr lang="fr-CH" dirty="0" smtClean="0">
-                <a:solidFill>
-                  <a:srgbClr val="C00000"/>
-                </a:solidFill>
-              </a:rPr>
-              <a:t>, </a:t>
-            </a:r>
-            <a:r>
-              <a:rPr lang="fr-CH" dirty="0" err="1" smtClean="0">
-                <a:solidFill>
-                  <a:srgbClr val="C00000"/>
-                </a:solidFill>
-              </a:rPr>
-              <a:t>produce</a:t>
-            </a:r>
-            <a:r>
-              <a:rPr lang="fr-CH" dirty="0" smtClean="0">
-                <a:solidFill>
-                  <a:srgbClr val="C00000"/>
-                </a:solidFill>
-              </a:rPr>
-              <a:t> data </a:t>
-            </a:r>
-            <a:r>
-              <a:rPr lang="fr-CH" dirty="0" err="1" smtClean="0">
-                <a:solidFill>
-                  <a:srgbClr val="C00000"/>
-                </a:solidFill>
-              </a:rPr>
-              <a:t>again</a:t>
-            </a:r>
-            <a:r>
-              <a:rPr lang="fr-CH" dirty="0" smtClean="0">
-                <a:solidFill>
-                  <a:srgbClr val="C00000"/>
-                </a:solidFill>
-              </a:rPr>
-              <a:t> (ICE, 100 sites, </a:t>
-            </a:r>
-            <a:r>
-              <a:rPr lang="fr-CH" dirty="0" err="1" smtClean="0">
-                <a:solidFill>
-                  <a:srgbClr val="C00000"/>
-                </a:solidFill>
-              </a:rPr>
-              <a:t>entire</a:t>
-            </a:r>
-            <a:r>
-              <a:rPr lang="fr-CH" dirty="0" smtClean="0">
-                <a:solidFill>
-                  <a:srgbClr val="C00000"/>
-                </a:solidFill>
-              </a:rPr>
-              <a:t> </a:t>
-            </a:r>
-            <a:r>
-              <a:rPr lang="fr-CH" dirty="0" err="1" smtClean="0">
-                <a:solidFill>
-                  <a:srgbClr val="C00000"/>
-                </a:solidFill>
-              </a:rPr>
-              <a:t>dataset</a:t>
-            </a:r>
-            <a:r>
-              <a:rPr lang="fr-CH" dirty="0" smtClean="0">
-                <a:solidFill>
-                  <a:srgbClr val="C00000"/>
-                </a:solidFill>
-              </a:rPr>
-              <a:t> 3000 sites)</a:t>
-            </a:r>
           </a:p>
         </p:txBody>
       </p:sp>
@@ -16856,7 +16929,9 @@
         </p:nvSpPr>
         <p:spPr/>
         <p:txBody>
-          <a:bodyPr/>
+          <a:bodyPr>
+            <a:normAutofit fontScale="92500" lnSpcReduction="10000"/>
+          </a:bodyPr>
           <a:lstStyle/>
           <a:p>
             <a:r>
@@ -16871,12 +16946,257 @@
           <a:p>
             <a:pPr lvl="1"/>
             <a:r>
+              <a:rPr lang="fr-CH" dirty="0" smtClean="0">
+                <a:solidFill>
+                  <a:schemeClr val="accent6"/>
+                </a:solidFill>
+              </a:rPr>
+              <a:t>Performance </a:t>
+            </a:r>
+            <a:r>
+              <a:rPr lang="fr-CH" dirty="0" err="1" smtClean="0">
+                <a:solidFill>
+                  <a:schemeClr val="accent6"/>
+                </a:solidFill>
+              </a:rPr>
+              <a:t>metrics</a:t>
+            </a:r>
+            <a:r>
+              <a:rPr lang="fr-CH" dirty="0" smtClean="0">
+                <a:solidFill>
+                  <a:schemeClr val="accent6"/>
+                </a:solidFill>
+              </a:rPr>
+              <a:t> </a:t>
+            </a:r>
+            <a:r>
+              <a:rPr lang="fr-CH" dirty="0" err="1" smtClean="0">
+                <a:solidFill>
+                  <a:schemeClr val="accent6"/>
+                </a:solidFill>
+              </a:rPr>
+              <a:t>during</a:t>
+            </a:r>
+            <a:r>
+              <a:rPr lang="fr-CH" dirty="0" smtClean="0">
+                <a:solidFill>
+                  <a:schemeClr val="accent6"/>
+                </a:solidFill>
+              </a:rPr>
+              <a:t> CV (</a:t>
+            </a:r>
+            <a:r>
+              <a:rPr lang="fr-CH" dirty="0" err="1" smtClean="0">
+                <a:solidFill>
+                  <a:schemeClr val="accent6"/>
+                </a:solidFill>
+              </a:rPr>
+              <a:t>standardized</a:t>
+            </a:r>
+            <a:r>
+              <a:rPr lang="fr-CH" dirty="0" smtClean="0">
+                <a:solidFill>
+                  <a:schemeClr val="accent6"/>
+                </a:solidFill>
+              </a:rPr>
+              <a:t> </a:t>
+            </a:r>
+            <a:r>
+              <a:rPr lang="fr-CH" dirty="0" err="1" smtClean="0">
+                <a:solidFill>
+                  <a:schemeClr val="accent6"/>
+                </a:solidFill>
+              </a:rPr>
+              <a:t>deviance</a:t>
+            </a:r>
+            <a:r>
+              <a:rPr lang="fr-CH" dirty="0" smtClean="0">
+                <a:solidFill>
+                  <a:schemeClr val="accent6"/>
+                </a:solidFill>
+              </a:rPr>
+              <a:t>, </a:t>
+            </a:r>
+            <a:r>
+              <a:rPr lang="fr-CH" dirty="0" err="1" smtClean="0">
+                <a:solidFill>
+                  <a:srgbClr val="C00000"/>
+                </a:solidFill>
+              </a:rPr>
+              <a:t>explanatory</a:t>
+            </a:r>
+            <a:r>
+              <a:rPr lang="fr-CH" dirty="0" smtClean="0">
+                <a:solidFill>
+                  <a:srgbClr val="C00000"/>
+                </a:solidFill>
+              </a:rPr>
+              <a:t> power</a:t>
+            </a:r>
+            <a:r>
+              <a:rPr lang="fr-CH" dirty="0" smtClean="0">
+                <a:solidFill>
+                  <a:schemeClr val="accent6"/>
+                </a:solidFill>
+              </a:rPr>
+              <a:t>, AUC, </a:t>
+            </a:r>
+            <a:r>
+              <a:rPr lang="fr-CH" dirty="0" err="1" smtClean="0">
+                <a:solidFill>
+                  <a:schemeClr val="accent6"/>
+                </a:solidFill>
+              </a:rPr>
+              <a:t>overfitting</a:t>
+            </a:r>
+            <a:r>
+              <a:rPr lang="fr-CH" dirty="0" smtClean="0">
+                <a:solidFill>
+                  <a:schemeClr val="accent6"/>
+                </a:solidFill>
+              </a:rPr>
+              <a:t>/</a:t>
+            </a:r>
+            <a:r>
+              <a:rPr lang="fr-CH" dirty="0" err="1" smtClean="0">
+                <a:solidFill>
+                  <a:schemeClr val="accent6"/>
+                </a:solidFill>
+              </a:rPr>
+              <a:t>likelihood</a:t>
+            </a:r>
+            <a:r>
+              <a:rPr lang="fr-CH" dirty="0" smtClean="0">
+                <a:solidFill>
+                  <a:schemeClr val="accent6"/>
+                </a:solidFill>
+              </a:rPr>
+              <a:t> ratio)</a:t>
+            </a:r>
+          </a:p>
+          <a:p>
+            <a:pPr lvl="1"/>
+            <a:r>
+              <a:rPr lang="fr-CH" dirty="0" err="1" smtClean="0">
+                <a:solidFill>
+                  <a:schemeClr val="accent6"/>
+                </a:solidFill>
+              </a:rPr>
+              <a:t>Recover</a:t>
+            </a:r>
+            <a:r>
+              <a:rPr lang="fr-CH" dirty="0" smtClean="0">
+                <a:solidFill>
+                  <a:schemeClr val="accent6"/>
+                </a:solidFill>
+              </a:rPr>
+              <a:t> correct plots for performance </a:t>
+            </a:r>
+            <a:r>
+              <a:rPr lang="fr-CH" dirty="0" err="1" smtClean="0">
+                <a:solidFill>
+                  <a:schemeClr val="accent6"/>
+                </a:solidFill>
+              </a:rPr>
+              <a:t>metric</a:t>
+            </a:r>
+            <a:endParaRPr lang="fr-CH" dirty="0" smtClean="0">
+              <a:solidFill>
+                <a:schemeClr val="accent6"/>
+              </a:solidFill>
+            </a:endParaRPr>
+          </a:p>
+          <a:p>
+            <a:pPr lvl="1"/>
+            <a:r>
+              <a:rPr lang="fr-CH" dirty="0" err="1" smtClean="0">
+                <a:solidFill>
+                  <a:schemeClr val="accent6"/>
+                </a:solidFill>
+              </a:rPr>
+              <a:t>Include</a:t>
+            </a:r>
+            <a:r>
+              <a:rPr lang="fr-CH" dirty="0" smtClean="0">
+                <a:solidFill>
+                  <a:schemeClr val="accent6"/>
+                </a:solidFill>
+              </a:rPr>
+              <a:t> </a:t>
+            </a:r>
+            <a:r>
+              <a:rPr lang="fr-CH" dirty="0" err="1" smtClean="0">
+                <a:solidFill>
+                  <a:schemeClr val="accent6"/>
+                </a:solidFill>
+              </a:rPr>
+              <a:t>null</a:t>
+            </a:r>
+            <a:r>
+              <a:rPr lang="fr-CH" dirty="0" smtClean="0">
+                <a:solidFill>
+                  <a:schemeClr val="accent6"/>
+                </a:solidFill>
+              </a:rPr>
+              <a:t> model</a:t>
+            </a:r>
+          </a:p>
+          <a:p>
+            <a:pPr lvl="1"/>
+            <a:r>
+              <a:rPr lang="fr-CH" dirty="0" err="1" smtClean="0">
+                <a:solidFill>
+                  <a:srgbClr val="C00000"/>
+                </a:solidFill>
+              </a:rPr>
+              <a:t>Include</a:t>
+            </a:r>
+            <a:r>
+              <a:rPr lang="fr-CH" dirty="0" smtClean="0">
+                <a:solidFill>
+                  <a:srgbClr val="C00000"/>
+                </a:solidFill>
+              </a:rPr>
+              <a:t> ANN</a:t>
+            </a:r>
+            <a:r>
               <a:rPr lang="fr-CH" dirty="0" smtClean="0"/>
-              <a:t>Performance </a:t>
+              <a:t>, </a:t>
+            </a:r>
+            <a:r>
+              <a:rPr lang="fr-CH" strike="sngStrike" dirty="0" err="1" smtClean="0"/>
+              <a:t>hGLM</a:t>
+            </a:r>
+            <a:r>
+              <a:rPr lang="fr-CH" dirty="0" smtClean="0"/>
+              <a:t>?</a:t>
+            </a:r>
+          </a:p>
+          <a:p>
+            <a:pPr lvl="1"/>
+            <a:r>
+              <a:rPr lang="fr-CH" dirty="0" smtClean="0"/>
+              <a:t>Check </a:t>
             </a:r>
             <a:r>
               <a:rPr lang="fr-CH" dirty="0" err="1" smtClean="0"/>
-              <a:t>metrics</a:t>
+              <a:t>noising</a:t>
+            </a:r>
+            <a:r>
+              <a:rPr lang="fr-CH" dirty="0" smtClean="0"/>
+              <a:t> scenarios, </a:t>
+            </a:r>
+            <a:r>
+              <a:rPr lang="fr-CH" dirty="0" err="1" smtClean="0"/>
+              <a:t>e.g</a:t>
+            </a:r>
+            <a:r>
+              <a:rPr lang="fr-CH" dirty="0" smtClean="0"/>
+              <a:t>., no </a:t>
+            </a:r>
+            <a:r>
+              <a:rPr lang="fr-CH" dirty="0" err="1" smtClean="0"/>
+              <a:t>bias</a:t>
             </a:r>
             <a:r>
               <a:rPr lang="fr-CH" dirty="0" smtClean="0"/>
@@ -16884,15 +17204,7 @@
             </a:r>
             <a:r>
               <a:rPr lang="fr-CH" dirty="0" err="1" smtClean="0"/>
-              <a:t>during</a:t>
-            </a:r>
-            <a:r>
-              <a:rPr lang="fr-CH" dirty="0" smtClean="0"/>
-              <a:t> CV (</a:t>
-            </a:r>
-            <a:r>
-              <a:rPr lang="fr-CH" dirty="0" err="1" smtClean="0"/>
-              <a:t>standardized</a:t>
+              <a:t>when</a:t>
             </a:r>
             <a:r>
               <a:rPr lang="fr-CH" dirty="0" smtClean="0"/>
@@ -16900,58 +17212,7 @@
             </a:r>
             <a:r>
               <a:rPr lang="fr-CH" dirty="0" err="1" smtClean="0"/>
-              <a:t>deviance</a:t>
-            </a:r>
-            <a:r>
-              <a:rPr lang="fr-CH" dirty="0" smtClean="0"/>
-              <a:t>, </a:t>
-            </a:r>
-            <a:r>
-              <a:rPr lang="fr-CH" dirty="0" err="1" smtClean="0"/>
-              <a:t>explanatory</a:t>
-            </a:r>
-            <a:r>
-              <a:rPr lang="fr-CH" dirty="0" smtClean="0"/>
-              <a:t> power, AUC, </a:t>
-            </a:r>
-            <a:r>
-              <a:rPr lang="fr-CH" dirty="0" err="1" smtClean="0"/>
-              <a:t>overfitting</a:t>
-            </a:r>
-            <a:r>
-              <a:rPr lang="fr-CH" dirty="0" smtClean="0"/>
-              <a:t>/</a:t>
-            </a:r>
-            <a:r>
-              <a:rPr lang="fr-CH" dirty="0" err="1" smtClean="0"/>
-              <a:t>likelihood</a:t>
-            </a:r>
-            <a:r>
-              <a:rPr lang="fr-CH" dirty="0" smtClean="0"/>
-              <a:t> ratio)</a:t>
-            </a:r>
-          </a:p>
-          <a:p>
-            <a:pPr lvl="1"/>
-            <a:r>
-              <a:rPr lang="fr-CH" dirty="0" err="1" smtClean="0"/>
-              <a:t>Recover</a:t>
-            </a:r>
-            <a:r>
-              <a:rPr lang="fr-CH" dirty="0" smtClean="0"/>
-              <a:t> correct plots for performance </a:t>
-            </a:r>
-            <a:r>
-              <a:rPr lang="fr-CH" dirty="0" err="1" smtClean="0"/>
-              <a:t>metric</a:t>
-            </a:r>
-            <a:endParaRPr lang="fr-CH" dirty="0" smtClean="0"/>
-          </a:p>
-          <a:p>
-            <a:pPr lvl="1"/>
-            <a:r>
-              <a:rPr lang="fr-CH" dirty="0" err="1" smtClean="0"/>
-              <a:t>Include</a:t>
+              <a:t>reducing</a:t>
             </a:r>
             <a:r>
               <a:rPr lang="fr-CH" dirty="0" smtClean="0"/>
@@ -16959,65 +17220,33 @@
             </a:r>
             <a:r>
               <a:rPr lang="fr-CH" dirty="0" err="1" smtClean="0"/>
-              <a:t>null</a:t>
-            </a:r>
-            <a:r>
-              <a:rPr lang="fr-CH" dirty="0" smtClean="0"/>
-              <a:t> model</a:t>
-            </a:r>
-          </a:p>
-          <a:p>
-            <a:pPr lvl="1"/>
-            <a:r>
-              <a:rPr lang="fr-CH" dirty="0" err="1" smtClean="0"/>
-              <a:t>Include</a:t>
-            </a:r>
-            <a:r>
-              <a:rPr lang="fr-CH" dirty="0" smtClean="0"/>
-              <a:t> ANN, </a:t>
-            </a:r>
-            <a:r>
-              <a:rPr lang="fr-CH" dirty="0" err="1" smtClean="0"/>
-              <a:t>hGLM</a:t>
-            </a:r>
-            <a:r>
-              <a:rPr lang="fr-CH" dirty="0" smtClean="0"/>
-              <a:t>?</a:t>
-            </a:r>
-          </a:p>
-          <a:p>
-            <a:pPr lvl="1"/>
-            <a:r>
-              <a:rPr lang="fr-CH" dirty="0" smtClean="0"/>
-              <a:t>Check </a:t>
-            </a:r>
-            <a:r>
-              <a:rPr lang="fr-CH" dirty="0" err="1" smtClean="0"/>
-              <a:t>noising</a:t>
-            </a:r>
-            <a:r>
-              <a:rPr lang="fr-CH" dirty="0" smtClean="0"/>
-              <a:t> scenarios, </a:t>
-            </a:r>
-            <a:r>
-              <a:rPr lang="fr-CH" dirty="0" err="1" smtClean="0"/>
-              <a:t>e.g</a:t>
-            </a:r>
-            <a:r>
-              <a:rPr lang="fr-CH" dirty="0" smtClean="0"/>
-              <a:t>., no </a:t>
-            </a:r>
-            <a:r>
-              <a:rPr lang="fr-CH" dirty="0" err="1" smtClean="0"/>
-              <a:t>bias</a:t>
+              <a:t>dataset</a:t>
             </a:r>
             <a:r>
               <a:rPr lang="fr-CH" dirty="0" smtClean="0"/>
               <a:t> </a:t>
             </a:r>
             <a:r>
+              <a:rPr lang="fr-CH" dirty="0" smtClean="0"/>
+              <a:t>size</a:t>
+            </a:r>
+          </a:p>
+          <a:p>
+            <a:pPr lvl="1"/>
+            <a:r>
               <a:rPr lang="fr-CH" dirty="0" err="1" smtClean="0"/>
-              <a:t>when</a:t>
+              <a:t>Add</a:t>
+            </a:r>
+            <a:r>
+              <a:rPr lang="fr-CH" dirty="0" smtClean="0"/>
+              <a:t> scenarios? </a:t>
+            </a:r>
+          </a:p>
+          <a:p>
+            <a:pPr lvl="2"/>
+            <a:r>
+              <a:rPr lang="fr-CH" dirty="0" err="1" smtClean="0"/>
+              <a:t>Reduce</a:t>
             </a:r>
             <a:r>
               <a:rPr lang="fr-CH" dirty="0" smtClean="0"/>
@@ -17025,19 +17254,67 @@
             </a:r>
             <a:r>
               <a:rPr lang="fr-CH" dirty="0" err="1" smtClean="0"/>
-              <a:t>reducing</a:t>
+              <a:t>dataset</a:t>
             </a:r>
             <a:r>
               <a:rPr lang="fr-CH" dirty="0" smtClean="0"/>
-              <a:t> </a:t>
+              <a:t> size to 100/300/500 </a:t>
+            </a:r>
+          </a:p>
+          <a:p>
+            <a:pPr lvl="2"/>
+            <a:r>
+              <a:rPr lang="fr-CH" dirty="0" smtClean="0"/>
+              <a:t>Noise on </a:t>
             </a:r>
             <a:r>
               <a:rPr lang="fr-CH" dirty="0" err="1" smtClean="0"/>
-              <a:t>dataset</a:t>
+              <a:t>response</a:t>
             </a:r>
             <a:r>
               <a:rPr lang="fr-CH" dirty="0" smtClean="0"/>
-              <a:t> size</a:t>
+              <a:t> variable (</a:t>
+            </a:r>
+            <a:r>
+              <a:rPr lang="fr-CH" dirty="0" err="1" smtClean="0"/>
+              <a:t>misdetection</a:t>
+            </a:r>
+            <a:r>
+              <a:rPr lang="fr-CH" dirty="0" smtClean="0"/>
+              <a:t>) </a:t>
+            </a:r>
+            <a:r>
+              <a:rPr lang="fr-CH" dirty="0" smtClean="0">
+                <a:sym typeface="Wingdings" panose="05000000000000000000" pitchFamily="2" charset="2"/>
+              </a:rPr>
+              <a:t> on all taxa</a:t>
+            </a:r>
+            <a:endParaRPr lang="fr-CH" dirty="0" smtClean="0"/>
+          </a:p>
+          <a:p>
+            <a:pPr lvl="2"/>
+            <a:r>
+              <a:rPr lang="fr-CH" dirty="0" smtClean="0"/>
+              <a:t>dispersal limitation</a:t>
+            </a:r>
+          </a:p>
+          <a:p>
+            <a:pPr lvl="1"/>
+            <a:r>
+              <a:rPr lang="fr-CH" dirty="0" err="1" smtClean="0"/>
+              <a:t>Produce</a:t>
+            </a:r>
+            <a:r>
+              <a:rPr lang="fr-CH" dirty="0" smtClean="0"/>
+              <a:t> ICE </a:t>
+            </a:r>
+            <a:r>
+              <a:rPr lang="fr-CH" dirty="0" err="1" smtClean="0"/>
+              <a:t>comparison</a:t>
+            </a:r>
+            <a:r>
+              <a:rPr lang="fr-CH" dirty="0" smtClean="0"/>
+              <a:t> for all taxa</a:t>
             </a:r>
             <a:endParaRPr lang="en-US" dirty="0"/>
           </a:p>

</xml_diff>